<commit_message>
Update Lecture Note-Lecutre 01
</commit_message>
<xml_diff>
--- a/Lecture Note/Lecture 01/Lecture 01.pptx
+++ b/Lecture Note/Lecture 01/Lecture 01.pptx
@@ -52,19 +52,19 @@
   <p:notesSz cx="6858000" cy="9144000"/>
   <p:embeddedFontLst>
     <p:embeddedFont>
-      <p:font typeface="나눔스퀘어라운드 Bold" panose="020B0600000101010101" pitchFamily="50" charset="-127"/>
-      <p:bold r:id="rId44"/>
-    </p:embeddedFont>
-    <p:embeddedFont>
       <p:font typeface="a옛날목욕탕B" panose="02020600000000000000" pitchFamily="18" charset="-127"/>
-      <p:regular r:id="rId45"/>
+      <p:regular r:id="rId44"/>
     </p:embeddedFont>
     <p:embeddedFont>
       <p:font typeface="Consolas" panose="020B0609020204030204" pitchFamily="49" charset="0"/>
-      <p:regular r:id="rId46"/>
-      <p:bold r:id="rId47"/>
-      <p:italic r:id="rId48"/>
-      <p:boldItalic r:id="rId49"/>
+      <p:regular r:id="rId45"/>
+      <p:bold r:id="rId46"/>
+      <p:italic r:id="rId47"/>
+      <p:boldItalic r:id="rId48"/>
+    </p:embeddedFont>
+    <p:embeddedFont>
+      <p:font typeface="나눔스퀘어라운드 Bold" panose="020B0600000101010101" pitchFamily="50" charset="-127"/>
+      <p:bold r:id="rId49"/>
     </p:embeddedFont>
     <p:embeddedFont>
       <p:font typeface="맑은 고딕" panose="020B0503020000020004" pitchFamily="50" charset="-127"/>
@@ -188,7 +188,7 @@
   <pc:docChgLst>
     <pc:chgData name="송용우" userId="5fec0c1f-fbad-4bae-b61b-9d64b9ac64ce" providerId="ADAL" clId="{5D0CB609-D922-4322-AC4D-B410EC1896AC}"/>
     <pc:docChg chg="undo custSel addSld delSld modSld sldOrd">
-      <pc:chgData name="송용우" userId="5fec0c1f-fbad-4bae-b61b-9d64b9ac64ce" providerId="ADAL" clId="{5D0CB609-D922-4322-AC4D-B410EC1896AC}" dt="2019-06-27T10:35:05.457" v="9677" actId="14100"/>
+      <pc:chgData name="송용우" userId="5fec0c1f-fbad-4bae-b61b-9d64b9ac64ce" providerId="ADAL" clId="{5D0CB609-D922-4322-AC4D-B410EC1896AC}" dt="2019-06-27T10:43:56.697" v="9683" actId="20577"/>
       <pc:docMkLst>
         <pc:docMk/>
       </pc:docMkLst>
@@ -3026,7 +3026,7 @@
         </pc:spChg>
       </pc:sldChg>
       <pc:sldChg chg="addSp delSp modSp add ord">
-        <pc:chgData name="송용우" userId="5fec0c1f-fbad-4bae-b61b-9d64b9ac64ce" providerId="ADAL" clId="{5D0CB609-D922-4322-AC4D-B410EC1896AC}" dt="2019-06-27T08:48:40.361" v="8924" actId="1076"/>
+        <pc:chgData name="송용우" userId="5fec0c1f-fbad-4bae-b61b-9d64b9ac64ce" providerId="ADAL" clId="{5D0CB609-D922-4322-AC4D-B410EC1896AC}" dt="2019-06-27T10:43:56.697" v="9683" actId="20577"/>
         <pc:sldMkLst>
           <pc:docMk/>
           <pc:sldMk cId="3307102473" sldId="305"/>
@@ -3056,7 +3056,7 @@
           </ac:spMkLst>
         </pc:spChg>
         <pc:spChg chg="add mod">
-          <ac:chgData name="송용우" userId="5fec0c1f-fbad-4bae-b61b-9d64b9ac64ce" providerId="ADAL" clId="{5D0CB609-D922-4322-AC4D-B410EC1896AC}" dt="2019-06-27T08:48:40.361" v="8924" actId="1076"/>
+          <ac:chgData name="송용우" userId="5fec0c1f-fbad-4bae-b61b-9d64b9ac64ce" providerId="ADAL" clId="{5D0CB609-D922-4322-AC4D-B410EC1896AC}" dt="2019-06-27T10:43:56.697" v="9683" actId="20577"/>
           <ac:spMkLst>
             <pc:docMk/>
             <pc:sldMk cId="3307102473" sldId="305"/>
@@ -27483,7 +27483,7 @@
                 <a:latin typeface="나눔스퀘어라운드 Bold" panose="020B0600000101010101" pitchFamily="50" charset="-127"/>
                 <a:ea typeface="나눔스퀘어라운드 Bold" panose="020B0600000101010101" pitchFamily="50" charset="-127"/>
               </a:rPr>
-              <a:t>&lt;div&gt;,&lt;span&gt;,&lt;table&gt; </a:t>
+              <a:t>&lt;div&gt;,&lt;span&gt;,&lt;table&gt;,&lt;a&gt; </a:t>
             </a:r>
             <a:r>
               <a:rPr lang="ko-KR" altLang="en-US" sz="3600" dirty="0">

</xml_diff>